<commit_message>
Subimos ppt S3 final de marketing
</commit_message>
<xml_diff>
--- a/Equip_B/results/Marketing/S3_Presentación_Marketing_vs_1024.pptx
+++ b/Equip_B/results/Marketing/S3_Presentación_Marketing_vs_1024.pptx
@@ -5,10 +5,10 @@
     <p:sldMasterId id="2147483648" r:id="rId4"/>
   </p:sldMasterIdLst>
   <p:notesMasterIdLst>
-    <p:notesMasterId r:id="rId20"/>
+    <p:notesMasterId r:id="rId21"/>
   </p:notesMasterIdLst>
   <p:handoutMasterIdLst>
-    <p:handoutMasterId r:id="rId21"/>
+    <p:handoutMasterId r:id="rId22"/>
   </p:handoutMasterIdLst>
   <p:sldIdLst>
     <p:sldId id="324" r:id="rId5"/>
@@ -25,7 +25,8 @@
     <p:sldId id="359" r:id="rId16"/>
     <p:sldId id="363" r:id="rId17"/>
     <p:sldId id="365" r:id="rId18"/>
-    <p:sldId id="335" r:id="rId19"/>
+    <p:sldId id="370" r:id="rId19"/>
+    <p:sldId id="335" r:id="rId20"/>
   </p:sldIdLst>
   <p:sldSz cx="12192000" cy="6858000"/>
   <p:notesSz cx="6858000" cy="9144000"/>
@@ -257,7 +258,7 @@
             <a:pPr rtl="0"/>
             <a:fld id="{75725A15-8D86-497D-8EAD-2EB1176C54F6}" type="datetime1">
               <a:rPr lang="es-ES" smtClean="0"/>
-              <a:t>24/10/2024</a:t>
+              <a:t>25/10/2024</a:t>
             </a:fld>
             <a:endParaRPr lang="es-ES"/>
           </a:p>
@@ -337,7 +338,7 @@
             <a:pPr rtl="0"/>
             <a:fld id="{682C0B10-7CAE-41E4-AB02-7E8B1FF2B898}" type="slidenum">
               <a:rPr lang="es-ES" smtClean="0"/>
-              <a:t>‹Nº›</a:t>
+              <a:t>‹#›</a:t>
             </a:fld>
             <a:endParaRPr lang="es-ES"/>
           </a:p>
@@ -439,7 +440,7 @@
             <a:fld id="{B958D509-07EE-4A09-900B-403023880868}" type="datetime1">
               <a:rPr lang="es-ES" smtClean="0"/>
               <a:pPr/>
-              <a:t>24/10/2024</a:t>
+              <a:t>25/10/2024</a:t>
             </a:fld>
             <a:endParaRPr lang="es-ES" dirty="0"/>
           </a:p>
@@ -600,7 +601,7 @@
             <a:pPr rtl="0"/>
             <a:fld id="{8530193B-564F-4854-8A52-728F3FB19C85}" type="slidenum">
               <a:rPr lang="es-ES" noProof="0" smtClean="0"/>
-              <a:t>‹Nº›</a:t>
+              <a:t>‹#›</a:t>
             </a:fld>
             <a:endParaRPr lang="es-ES" noProof="0"/>
           </a:p>
@@ -1023,6 +1024,115 @@
         <p:cNvPr id="1" name="">
           <a:extLst>
             <a:ext uri="{FF2B5EF4-FFF2-40B4-BE49-F238E27FC236}">
+              <a16:creationId xmlns:a16="http://schemas.microsoft.com/office/drawing/2014/main" id="{05DB5F8B-C47F-E364-FF4F-0710957ADB2F}"/>
+            </a:ext>
+          </a:extLst>
+        </p:cNvPr>
+        <p:cNvGrpSpPr/>
+        <p:nvPr/>
+      </p:nvGrpSpPr>
+      <p:grpSpPr>
+        <a:xfrm>
+          <a:off x="0" y="0"/>
+          <a:ext cx="0" cy="0"/>
+          <a:chOff x="0" y="0"/>
+          <a:chExt cx="0" cy="0"/>
+        </a:xfrm>
+      </p:grpSpPr>
+      <p:sp>
+        <p:nvSpPr>
+          <p:cNvPr id="2" name="Marcador de imagen de diapositiva 1">
+            <a:extLst>
+              <a:ext uri="{FF2B5EF4-FFF2-40B4-BE49-F238E27FC236}">
+                <a16:creationId xmlns:a16="http://schemas.microsoft.com/office/drawing/2014/main" id="{B43889D0-0E6B-1C3E-A08A-481B08938A4E}"/>
+              </a:ext>
+            </a:extLst>
+          </p:cNvPr>
+          <p:cNvSpPr>
+            <a:spLocks noGrp="1" noRot="1" noChangeAspect="1"/>
+          </p:cNvSpPr>
+          <p:nvPr>
+            <p:ph type="sldImg"/>
+          </p:nvPr>
+        </p:nvSpPr>
+        <p:spPr/>
+      </p:sp>
+      <p:sp>
+        <p:nvSpPr>
+          <p:cNvPr id="3" name="Marcador de notas 2">
+            <a:extLst>
+              <a:ext uri="{FF2B5EF4-FFF2-40B4-BE49-F238E27FC236}">
+                <a16:creationId xmlns:a16="http://schemas.microsoft.com/office/drawing/2014/main" id="{F62FB440-6DD3-AE5B-8243-49CB15AF8730}"/>
+              </a:ext>
+            </a:extLst>
+          </p:cNvPr>
+          <p:cNvSpPr>
+            <a:spLocks noGrp="1"/>
+          </p:cNvSpPr>
+          <p:nvPr>
+            <p:ph type="body" idx="1"/>
+          </p:nvPr>
+        </p:nvSpPr>
+        <p:spPr/>
+        <p:txBody>
+          <a:bodyPr/>
+          <a:lstStyle/>
+          <a:p>
+            <a:endParaRPr lang="es-ES" dirty="0"/>
+          </a:p>
+        </p:txBody>
+      </p:sp>
+      <p:sp>
+        <p:nvSpPr>
+          <p:cNvPr id="4" name="Marcador de número de diapositiva 3">
+            <a:extLst>
+              <a:ext uri="{FF2B5EF4-FFF2-40B4-BE49-F238E27FC236}">
+                <a16:creationId xmlns:a16="http://schemas.microsoft.com/office/drawing/2014/main" id="{95581750-F2D6-8825-E734-274E3CA2386C}"/>
+              </a:ext>
+            </a:extLst>
+          </p:cNvPr>
+          <p:cNvSpPr>
+            <a:spLocks noGrp="1"/>
+          </p:cNvSpPr>
+          <p:nvPr>
+            <p:ph type="sldNum" sz="quarter" idx="5"/>
+          </p:nvPr>
+        </p:nvSpPr>
+        <p:spPr/>
+        <p:txBody>
+          <a:bodyPr/>
+          <a:lstStyle/>
+          <a:p>
+            <a:pPr rtl="0"/>
+            <a:fld id="{8530193B-564F-4854-8A52-728F3FB19C85}" type="slidenum">
+              <a:rPr lang="es-ES" noProof="0" smtClean="0"/>
+              <a:t>15</a:t>
+            </a:fld>
+            <a:endParaRPr lang="es-ES" noProof="0"/>
+          </a:p>
+        </p:txBody>
+      </p:sp>
+    </p:spTree>
+    <p:extLst>
+      <p:ext uri="{BB962C8B-B14F-4D97-AF65-F5344CB8AC3E}">
+        <p14:creationId xmlns:p14="http://schemas.microsoft.com/office/powerpoint/2010/main" val="46208134"/>
+      </p:ext>
+    </p:extLst>
+  </p:cSld>
+  <p:clrMapOvr>
+    <a:masterClrMapping/>
+  </p:clrMapOvr>
+</p:notes>
+</file>
+
+<file path=ppt/notesSlides/notesSlide5.xml><?xml version="1.0" encoding="utf-8"?>
+<p:notes xmlns:a="http://schemas.openxmlformats.org/drawingml/2006/main" xmlns:r="http://schemas.openxmlformats.org/officeDocument/2006/relationships" xmlns:p="http://schemas.openxmlformats.org/presentationml/2006/main">
+  <p:cSld>
+    <p:spTree>
+      <p:nvGrpSpPr>
+        <p:cNvPr id="1" name="">
+          <a:extLst>
+            <a:ext uri="{FF2B5EF4-FFF2-40B4-BE49-F238E27FC236}">
               <a16:creationId xmlns:a16="http://schemas.microsoft.com/office/drawing/2014/main" id="{B009C85F-EC1B-CFD1-A657-E7902541FA4B}"/>
             </a:ext>
           </a:extLst>
@@ -1106,7 +1216,7 @@
             <a:pPr rtl="0"/>
             <a:fld id="{8530193B-564F-4854-8A52-728F3FB19C85}" type="slidenum">
               <a:rPr lang="es-ES" smtClean="0"/>
-              <a:t>15</a:t>
+              <a:t>16</a:t>
             </a:fld>
             <a:endParaRPr lang="es-ES"/>
           </a:p>
@@ -7916,7 +8026,7 @@
                   <a:schemeClr val="accent2"/>
                 </a:solidFill>
               </a:rPr>
-              <a:t>24/10/2024</a:t>
+              <a:t>25/10/2024</a:t>
             </a:fld>
             <a:endParaRPr lang="es-ES" sz="1100" noProof="0" dirty="0">
               <a:solidFill>
@@ -8188,7 +8298,7 @@
                 </a:solidFill>
               </a:rPr>
               <a:pPr algn="r" rtl="0"/>
-              <a:t>‹Nº›</a:t>
+              <a:t>‹#›</a:t>
             </a:fld>
             <a:endParaRPr lang="es-ES" sz="1100" noProof="0">
               <a:solidFill>
@@ -10884,6 +10994,410 @@
 </file>
 
 <file path=ppt/slides/slide15.xml><?xml version="1.0" encoding="utf-8"?>
+<p:sld xmlns:a="http://schemas.openxmlformats.org/drawingml/2006/main" xmlns:r="http://schemas.openxmlformats.org/officeDocument/2006/relationships" xmlns:p="http://schemas.openxmlformats.org/presentationml/2006/main">
+  <p:cSld>
+    <p:spTree>
+      <p:nvGrpSpPr>
+        <p:cNvPr id="1" name="">
+          <a:extLst>
+            <a:ext uri="{FF2B5EF4-FFF2-40B4-BE49-F238E27FC236}">
+              <a16:creationId xmlns:a16="http://schemas.microsoft.com/office/drawing/2014/main" id="{2E8AFFAE-1245-19B5-3C60-58AC8A5EA54D}"/>
+            </a:ext>
+          </a:extLst>
+        </p:cNvPr>
+        <p:cNvGrpSpPr/>
+        <p:nvPr/>
+      </p:nvGrpSpPr>
+      <p:grpSpPr>
+        <a:xfrm>
+          <a:off x="0" y="0"/>
+          <a:ext cx="0" cy="0"/>
+          <a:chOff x="0" y="0"/>
+          <a:chExt cx="0" cy="0"/>
+        </a:xfrm>
+      </p:grpSpPr>
+      <p:sp>
+        <p:nvSpPr>
+          <p:cNvPr id="6" name="Rectángulo 5">
+            <a:extLst>
+              <a:ext uri="{FF2B5EF4-FFF2-40B4-BE49-F238E27FC236}">
+                <a16:creationId xmlns:a16="http://schemas.microsoft.com/office/drawing/2014/main" id="{82C12619-B1CF-D3F7-B28B-32652C0F05E3}"/>
+              </a:ext>
+            </a:extLst>
+          </p:cNvPr>
+          <p:cNvSpPr/>
+          <p:nvPr/>
+        </p:nvSpPr>
+        <p:spPr>
+          <a:xfrm>
+            <a:off x="0" y="6400800"/>
+            <a:ext cx="2557670" cy="457200"/>
+          </a:xfrm>
+          <a:prstGeom prst="rect">
+            <a:avLst/>
+          </a:prstGeom>
+          <a:solidFill>
+            <a:schemeClr val="bg1">
+              <a:lumMod val="95000"/>
+            </a:schemeClr>
+          </a:solidFill>
+          <a:ln>
+            <a:noFill/>
+          </a:ln>
+        </p:spPr>
+        <p:style>
+          <a:lnRef idx="2">
+            <a:schemeClr val="accent1">
+              <a:shade val="50000"/>
+            </a:schemeClr>
+          </a:lnRef>
+          <a:fillRef idx="1">
+            <a:schemeClr val="accent1"/>
+          </a:fillRef>
+          <a:effectRef idx="0">
+            <a:schemeClr val="accent1"/>
+          </a:effectRef>
+          <a:fontRef idx="minor">
+            <a:schemeClr val="lt1"/>
+          </a:fontRef>
+        </p:style>
+        <p:txBody>
+          <a:bodyPr rtlCol="0" anchor="ctr"/>
+          <a:lstStyle/>
+          <a:p>
+            <a:pPr algn="ctr"/>
+            <a:endParaRPr lang="es-ES"/>
+          </a:p>
+        </p:txBody>
+      </p:sp>
+      <p:sp>
+        <p:nvSpPr>
+          <p:cNvPr id="4" name="Rectángulo: esquinas redondeadas 3">
+            <a:extLst>
+              <a:ext uri="{FF2B5EF4-FFF2-40B4-BE49-F238E27FC236}">
+                <a16:creationId xmlns:a16="http://schemas.microsoft.com/office/drawing/2014/main" id="{0EF04D99-B7F8-3573-2F18-E88215F913F3}"/>
+              </a:ext>
+            </a:extLst>
+          </p:cNvPr>
+          <p:cNvSpPr/>
+          <p:nvPr/>
+        </p:nvSpPr>
+        <p:spPr>
+          <a:xfrm>
+            <a:off x="455833" y="1625256"/>
+            <a:ext cx="10199334" cy="4803820"/>
+          </a:xfrm>
+          <a:prstGeom prst="roundRect">
+            <a:avLst>
+              <a:gd name="adj" fmla="val 7845"/>
+            </a:avLst>
+          </a:prstGeom>
+          <a:solidFill>
+            <a:schemeClr val="bg1"/>
+          </a:solidFill>
+          <a:ln>
+            <a:noFill/>
+          </a:ln>
+        </p:spPr>
+        <p:style>
+          <a:lnRef idx="2">
+            <a:schemeClr val="accent1">
+              <a:shade val="50000"/>
+            </a:schemeClr>
+          </a:lnRef>
+          <a:fillRef idx="1">
+            <a:schemeClr val="accent1"/>
+          </a:fillRef>
+          <a:effectRef idx="0">
+            <a:schemeClr val="accent1"/>
+          </a:effectRef>
+          <a:fontRef idx="minor">
+            <a:schemeClr val="lt1"/>
+          </a:fontRef>
+        </p:style>
+        <p:txBody>
+          <a:bodyPr rtlCol="0" anchor="ctr"/>
+          <a:lstStyle/>
+          <a:p>
+            <a:pPr algn="ctr"/>
+            <a:endParaRPr lang="es-ES" dirty="0"/>
+          </a:p>
+        </p:txBody>
+      </p:sp>
+      <p:sp>
+        <p:nvSpPr>
+          <p:cNvPr id="5" name="QuadreDeText 3">
+            <a:extLst>
+              <a:ext uri="{FF2B5EF4-FFF2-40B4-BE49-F238E27FC236}">
+                <a16:creationId xmlns:a16="http://schemas.microsoft.com/office/drawing/2014/main" id="{8D4C57D9-90FA-1254-9EC5-207A0AEE2D7F}"/>
+              </a:ext>
+            </a:extLst>
+          </p:cNvPr>
+          <p:cNvSpPr txBox="1"/>
+          <p:nvPr/>
+        </p:nvSpPr>
+        <p:spPr>
+          <a:xfrm>
+            <a:off x="2046000" y="673204"/>
+            <a:ext cx="11230211" cy="707886"/>
+          </a:xfrm>
+          <a:prstGeom prst="rect">
+            <a:avLst/>
+          </a:prstGeom>
+          <a:noFill/>
+        </p:spPr>
+        <p:txBody>
+          <a:bodyPr wrap="square">
+            <a:spAutoFit/>
+          </a:bodyPr>
+          <a:lstStyle/>
+          <a:p>
+            <a:r>
+              <a:rPr lang="es-ES" sz="2400" b="1" dirty="0">
+                <a:solidFill>
+                  <a:schemeClr val="accent3">
+                    <a:lumMod val="50000"/>
+                  </a:schemeClr>
+                </a:solidFill>
+                <a:effectLst/>
+                <a:latin typeface="+mj-lt"/>
+              </a:rPr>
+              <a:t>PROPUESTAS </a:t>
+            </a:r>
+            <a:r>
+              <a:rPr lang="es-ES" sz="2400" b="1" dirty="0">
+                <a:solidFill>
+                  <a:schemeClr val="accent3">
+                    <a:lumMod val="50000"/>
+                  </a:schemeClr>
+                </a:solidFill>
+                <a:latin typeface="+mj-lt"/>
+              </a:rPr>
+              <a:t>DE PRIORIZACIÓN DE DÍAS DE LA SEMANA </a:t>
+            </a:r>
+            <a:endParaRPr lang="es-ES" sz="2400" b="1" dirty="0">
+              <a:solidFill>
+                <a:schemeClr val="accent3">
+                  <a:lumMod val="50000"/>
+                </a:schemeClr>
+              </a:solidFill>
+              <a:effectLst/>
+              <a:latin typeface="+mj-lt"/>
+            </a:endParaRPr>
+          </a:p>
+          <a:p>
+            <a:endParaRPr lang="es-ES" sz="1600" b="1" dirty="0"/>
+          </a:p>
+        </p:txBody>
+      </p:sp>
+      <p:sp>
+        <p:nvSpPr>
+          <p:cNvPr id="30" name="CuadroTexto 29">
+            <a:extLst>
+              <a:ext uri="{FF2B5EF4-FFF2-40B4-BE49-F238E27FC236}">
+                <a16:creationId xmlns:a16="http://schemas.microsoft.com/office/drawing/2014/main" id="{6B0A3DF6-5B8C-C82E-4007-09D066866A92}"/>
+              </a:ext>
+            </a:extLst>
+          </p:cNvPr>
+          <p:cNvSpPr txBox="1"/>
+          <p:nvPr/>
+        </p:nvSpPr>
+        <p:spPr>
+          <a:xfrm>
+            <a:off x="825135" y="2523781"/>
+            <a:ext cx="9733779" cy="1787723"/>
+          </a:xfrm>
+          <a:prstGeom prst="roundRect">
+            <a:avLst/>
+          </a:prstGeom>
+          <a:noFill/>
+          <a:ln w="19050">
+            <a:solidFill>
+              <a:srgbClr val="92D050"/>
+            </a:solidFill>
+            <a:prstDash val="sysDash"/>
+          </a:ln>
+        </p:spPr>
+        <p:txBody>
+          <a:bodyPr wrap="square">
+            <a:spAutoFit/>
+          </a:bodyPr>
+          <a:lstStyle/>
+          <a:p>
+            <a:pPr marL="171450" indent="-171450" algn="just">
+              <a:spcBef>
+                <a:spcPts val="300"/>
+              </a:spcBef>
+              <a:buFont typeface="Arial" panose="020B0604020202020204" pitchFamily="34" charset="0"/>
+              <a:buChar char="•"/>
+            </a:pPr>
+            <a:r>
+              <a:rPr lang="es-ES" sz="1200" dirty="0"/>
+              <a:t>Aumento de las campañas en la semana 2</a:t>
+            </a:r>
+          </a:p>
+          <a:p>
+            <a:pPr marL="171450" indent="-171450" algn="just">
+              <a:spcBef>
+                <a:spcPts val="300"/>
+              </a:spcBef>
+              <a:buFont typeface="Arial" panose="020B0604020202020204" pitchFamily="34" charset="0"/>
+              <a:buChar char="•"/>
+            </a:pPr>
+            <a:r>
+              <a:rPr lang="es-ES" sz="1200" dirty="0"/>
+              <a:t>Segmentar las campañas por edad </a:t>
+            </a:r>
+          </a:p>
+          <a:p>
+            <a:pPr marL="171450" indent="-171450" algn="just">
+              <a:spcBef>
+                <a:spcPts val="300"/>
+              </a:spcBef>
+              <a:buFont typeface="Arial" panose="020B0604020202020204" pitchFamily="34" charset="0"/>
+              <a:buChar char="•"/>
+            </a:pPr>
+            <a:r>
+              <a:rPr lang="es-ES" sz="1200" dirty="0"/>
+              <a:t>Ofrecer incentivos adicionales o maneras de retener al cliente en la semana 4</a:t>
+            </a:r>
+          </a:p>
+          <a:p>
+            <a:pPr marL="171450" indent="-171450" algn="just">
+              <a:spcBef>
+                <a:spcPts val="300"/>
+              </a:spcBef>
+              <a:buFont typeface="Arial" panose="020B0604020202020204" pitchFamily="34" charset="0"/>
+              <a:buChar char="•"/>
+            </a:pPr>
+            <a:r>
+              <a:rPr lang="es-ES" sz="1200" dirty="0"/>
+              <a:t>Diversificar el contacto a otras opciones, </a:t>
+            </a:r>
+            <a:r>
+              <a:rPr lang="es-ES" sz="1200" dirty="0" err="1"/>
+              <a:t>sobretodo</a:t>
+            </a:r>
+            <a:r>
+              <a:rPr lang="es-ES" sz="1200" dirty="0"/>
+              <a:t> en la semana 4 que es donde pierde eficacia</a:t>
+            </a:r>
+          </a:p>
+          <a:p>
+            <a:pPr marL="171450" indent="-171450" algn="just">
+              <a:spcBef>
+                <a:spcPts val="300"/>
+              </a:spcBef>
+              <a:buFont typeface="Arial" panose="020B0604020202020204" pitchFamily="34" charset="0"/>
+              <a:buChar char="•"/>
+            </a:pPr>
+            <a:r>
+              <a:rPr lang="es-ES" sz="1200" dirty="0"/>
+              <a:t>Estrategia de fidelización con los clientes que compraron en campañas anteriores, ya que tienen muy buena tasa de conversión</a:t>
+            </a:r>
+          </a:p>
+          <a:p>
+            <a:pPr marL="171450" indent="-171450" algn="just">
+              <a:spcBef>
+                <a:spcPts val="300"/>
+              </a:spcBef>
+              <a:buFont typeface="Arial" panose="020B0604020202020204" pitchFamily="34" charset="0"/>
+              <a:buChar char="•"/>
+            </a:pPr>
+            <a:r>
+              <a:rPr lang="es-ES" sz="1200" dirty="0"/>
+              <a:t>Optimizar la duración de las llamadas</a:t>
+            </a:r>
+          </a:p>
+          <a:p>
+            <a:pPr marL="171450" indent="-171450" algn="just">
+              <a:spcBef>
+                <a:spcPts val="300"/>
+              </a:spcBef>
+              <a:buFont typeface="Arial" panose="020B0604020202020204" pitchFamily="34" charset="0"/>
+              <a:buChar char="•"/>
+            </a:pPr>
+            <a:endParaRPr lang="es-ES" sz="1200" dirty="0"/>
+          </a:p>
+        </p:txBody>
+      </p:sp>
+      <p:sp>
+        <p:nvSpPr>
+          <p:cNvPr id="9" name="Rectángulo: esquinas redondeadas 8">
+            <a:extLst>
+              <a:ext uri="{FF2B5EF4-FFF2-40B4-BE49-F238E27FC236}">
+                <a16:creationId xmlns:a16="http://schemas.microsoft.com/office/drawing/2014/main" id="{3FAEE228-6729-211B-2A46-8B3A02A83818}"/>
+              </a:ext>
+            </a:extLst>
+          </p:cNvPr>
+          <p:cNvSpPr/>
+          <p:nvPr/>
+        </p:nvSpPr>
+        <p:spPr>
+          <a:xfrm>
+            <a:off x="3628091" y="1894754"/>
+            <a:ext cx="4127865" cy="449964"/>
+          </a:xfrm>
+          <a:prstGeom prst="roundRect">
+            <a:avLst>
+              <a:gd name="adj" fmla="val 27880"/>
+            </a:avLst>
+          </a:prstGeom>
+          <a:solidFill>
+            <a:srgbClr val="D2ECB6"/>
+          </a:solidFill>
+          <a:ln>
+            <a:solidFill>
+              <a:srgbClr val="92D050"/>
+            </a:solidFill>
+          </a:ln>
+        </p:spPr>
+        <p:style>
+          <a:lnRef idx="2">
+            <a:schemeClr val="accent1">
+              <a:shade val="50000"/>
+            </a:schemeClr>
+          </a:lnRef>
+          <a:fillRef idx="1">
+            <a:schemeClr val="accent1"/>
+          </a:fillRef>
+          <a:effectRef idx="0">
+            <a:schemeClr val="accent1"/>
+          </a:effectRef>
+          <a:fontRef idx="minor">
+            <a:schemeClr val="lt1"/>
+          </a:fontRef>
+        </p:style>
+        <p:txBody>
+          <a:bodyPr rtlCol="0" anchor="ctr"/>
+          <a:lstStyle/>
+          <a:p>
+            <a:pPr algn="ctr"/>
+            <a:r>
+              <a:rPr lang="es-ES" sz="1400" dirty="0">
+                <a:solidFill>
+                  <a:schemeClr val="tx1"/>
+                </a:solidFill>
+              </a:rPr>
+              <a:t>Propuestas Finales</a:t>
+            </a:r>
+          </a:p>
+        </p:txBody>
+      </p:sp>
+    </p:spTree>
+    <p:extLst>
+      <p:ext uri="{BB962C8B-B14F-4D97-AF65-F5344CB8AC3E}">
+        <p14:creationId xmlns:p14="http://schemas.microsoft.com/office/powerpoint/2010/main" val="1116773118"/>
+      </p:ext>
+    </p:extLst>
+  </p:cSld>
+  <p:clrMapOvr>
+    <a:masterClrMapping/>
+  </p:clrMapOvr>
+</p:sld>
+</file>
+
+<file path=ppt/slides/slide16.xml><?xml version="1.0" encoding="utf-8"?>
 <p:sld xmlns:a="http://schemas.openxmlformats.org/drawingml/2006/main" xmlns:r="http://schemas.openxmlformats.org/officeDocument/2006/relationships" xmlns:p="http://schemas.openxmlformats.org/presentationml/2006/main">
   <p:cSld>
     <p:bg>
@@ -15479,21 +15993,21 @@
 </file>
 
 <file path=customXml/item1.xml><?xml version="1.0" encoding="utf-8"?>
+<p:properties xmlns:p="http://schemas.microsoft.com/office/2006/metadata/properties" xmlns:xsi="http://www.w3.org/2001/XMLSchema-instance" xmlns:pc="http://schemas.microsoft.com/office/infopath/2007/PartnerControls">
+  <documentManagement>
+    <Status xmlns="71af3243-3dd4-4a8d-8c0d-dd76da1f02a5">Not started</Status>
+    <MediaServiceKeyPoints xmlns="71af3243-3dd4-4a8d-8c0d-dd76da1f02a5" xsi:nil="true"/>
+  </documentManagement>
+</p:properties>
+</file>
+
+<file path=customXml/item2.xml><?xml version="1.0" encoding="utf-8"?>
 <?mso-contentType ?>
 <FormTemplates xmlns="http://schemas.microsoft.com/sharepoint/v3/contenttype/forms">
   <Display>DocumentLibraryForm</Display>
   <Edit>DocumentLibraryForm</Edit>
   <New>DocumentLibraryForm</New>
 </FormTemplates>
-</file>
-
-<file path=customXml/item2.xml><?xml version="1.0" encoding="utf-8"?>
-<p:properties xmlns:p="http://schemas.microsoft.com/office/2006/metadata/properties" xmlns:xsi="http://www.w3.org/2001/XMLSchema-instance" xmlns:pc="http://schemas.microsoft.com/office/infopath/2007/PartnerControls">
-  <documentManagement>
-    <Status xmlns="71af3243-3dd4-4a8d-8c0d-dd76da1f02a5">Not started</Status>
-    <MediaServiceKeyPoints xmlns="71af3243-3dd4-4a8d-8c0d-dd76da1f02a5" xsi:nil="true"/>
-  </documentManagement>
-</p:properties>
 </file>
 
 <file path=customXml/item3.xml><?xml version="1.0" encoding="utf-8"?>
@@ -15718,19 +16232,19 @@
 </file>
 
 <file path=customXml/itemProps1.xml><?xml version="1.0" encoding="utf-8"?>
-<ds:datastoreItem xmlns:ds="http://schemas.openxmlformats.org/officeDocument/2006/customXml" ds:itemID="{05D99ABA-76CE-4A8E-B5F0-C051B96628DE}">
+<ds:datastoreItem xmlns:ds="http://schemas.openxmlformats.org/officeDocument/2006/customXml" ds:itemID="{4DEA9014-ED64-4558-B1E1-D03F0EE32BEB}">
   <ds:schemaRefs>
-    <ds:schemaRef ds:uri="http://schemas.microsoft.com/sharepoint/v3/contenttype/forms"/>
+    <ds:schemaRef ds:uri="http://schemas.microsoft.com/office/2006/metadata/properties"/>
+    <ds:schemaRef ds:uri="http://schemas.microsoft.com/office/infopath/2007/PartnerControls"/>
+    <ds:schemaRef ds:uri="71af3243-3dd4-4a8d-8c0d-dd76da1f02a5"/>
   </ds:schemaRefs>
 </ds:datastoreItem>
 </file>
 
 <file path=customXml/itemProps2.xml><?xml version="1.0" encoding="utf-8"?>
-<ds:datastoreItem xmlns:ds="http://schemas.openxmlformats.org/officeDocument/2006/customXml" ds:itemID="{4DEA9014-ED64-4558-B1E1-D03F0EE32BEB}">
+<ds:datastoreItem xmlns:ds="http://schemas.openxmlformats.org/officeDocument/2006/customXml" ds:itemID="{05D99ABA-76CE-4A8E-B5F0-C051B96628DE}">
   <ds:schemaRefs>
-    <ds:schemaRef ds:uri="http://schemas.microsoft.com/office/2006/metadata/properties"/>
-    <ds:schemaRef ds:uri="http://schemas.microsoft.com/office/infopath/2007/PartnerControls"/>
-    <ds:schemaRef ds:uri="71af3243-3dd4-4a8d-8c0d-dd76da1f02a5"/>
+    <ds:schemaRef ds:uri="http://schemas.microsoft.com/sharepoint/v3/contenttype/forms"/>
   </ds:schemaRefs>
 </ds:datastoreItem>
 </file>

</xml_diff>